<commit_message>
Changes Dennis to Präsi
</commit_message>
<xml_diff>
--- a/Präsi/Digitales Theremin.pptx
+++ b/Präsi/Digitales Theremin.pptx
@@ -4506,7 +4506,19 @@
           <a:bodyPr/>
           <a:lstStyle/>
           <a:p>
-            <a:endParaRPr lang="de-CH"/>
+            <a:r>
+              <a:rPr lang="de-CH" dirty="0"/>
+              <a:t>Überarbeitung des PCB</a:t>
+            </a:r>
+          </a:p>
+          <a:p>
+            <a:r>
+              <a:rPr lang="de-CH" dirty="0"/>
+              <a:t>Implementierung von Zusatzeffekten</a:t>
+            </a:r>
+          </a:p>
+          <a:p>
+            <a:endParaRPr lang="de-CH" dirty="0"/>
           </a:p>
         </p:txBody>
       </p:sp>
@@ -5072,6 +5084,42 @@
           </a:p>
         </p:txBody>
       </p:sp>
+      <p:pic>
+        <p:nvPicPr>
+          <p:cNvPr id="7" name="Grafik 6" descr="Ein Bild, das Screenshot, Zeichnung enthält.&#10;&#10;Automatisch generierte Beschreibung">
+            <a:extLst>
+              <a:ext uri="{FF2B5EF4-FFF2-40B4-BE49-F238E27FC236}">
+                <a16:creationId xmlns:a16="http://schemas.microsoft.com/office/drawing/2014/main" id="{E94963EC-E027-40BA-90E8-7040FD65B82D}"/>
+              </a:ext>
+            </a:extLst>
+          </p:cNvPr>
+          <p:cNvPicPr>
+            <a:picLocks noChangeAspect="1"/>
+          </p:cNvPicPr>
+          <p:nvPr/>
+        </p:nvPicPr>
+        <p:blipFill>
+          <a:blip r:embed="rId3">
+            <a:extLst>
+              <a:ext uri="{28A0092B-C50C-407E-A947-70E740481C1C}">
+                <a14:useLocalDpi xmlns:a14="http://schemas.microsoft.com/office/drawing/2010/main" val="0"/>
+              </a:ext>
+            </a:extLst>
+          </a:blip>
+          <a:stretch>
+            <a:fillRect/>
+          </a:stretch>
+        </p:blipFill>
+        <p:spPr>
+          <a:xfrm>
+            <a:off x="8301984" y="782637"/>
+            <a:ext cx="3051816" cy="2290577"/>
+          </a:xfrm>
+          <a:prstGeom prst="rect">
+            <a:avLst/>
+          </a:prstGeom>
+        </p:spPr>
+      </p:pic>
     </p:spTree>
     <p:extLst>
       <p:ext uri="{BB962C8B-B14F-4D97-AF65-F5344CB8AC3E}">
@@ -5153,13 +5201,84 @@
           <a:p>
             <a:r>
               <a:rPr lang="de-CH" dirty="0"/>
-              <a:t>Bild für Kalibration einfügen</a:t>
+              <a:t>Oszillatoren abstimmen</a:t>
             </a:r>
           </a:p>
           <a:p>
             <a:r>
               <a:rPr lang="de-CH" dirty="0"/>
-              <a:t>Bild des Display einfügen</a:t>
+              <a:t>Für optimales Spielen</a:t>
+            </a:r>
+          </a:p>
+        </p:txBody>
+      </p:sp>
+      <p:pic>
+        <p:nvPicPr>
+          <p:cNvPr id="8" name="Grafik 7" descr="Ein Bild, das Uhr enthält.&#10;&#10;Automatisch generierte Beschreibung">
+            <a:extLst>
+              <a:ext uri="{FF2B5EF4-FFF2-40B4-BE49-F238E27FC236}">
+                <a16:creationId xmlns:a16="http://schemas.microsoft.com/office/drawing/2014/main" id="{8955CD08-EEE9-4C45-8AC1-3EB38CD865AA}"/>
+              </a:ext>
+            </a:extLst>
+          </p:cNvPr>
+          <p:cNvPicPr>
+            <a:picLocks noChangeAspect="1"/>
+          </p:cNvPicPr>
+          <p:nvPr/>
+        </p:nvPicPr>
+        <p:blipFill>
+          <a:blip r:embed="rId2">
+            <a:extLst>
+              <a:ext uri="{28A0092B-C50C-407E-A947-70E740481C1C}">
+                <a14:useLocalDpi xmlns:a14="http://schemas.microsoft.com/office/drawing/2010/main" val="0"/>
+              </a:ext>
+            </a:extLst>
+          </a:blip>
+          <a:stretch>
+            <a:fillRect/>
+          </a:stretch>
+        </p:blipFill>
+        <p:spPr>
+          <a:xfrm>
+            <a:off x="8301984" y="782637"/>
+            <a:ext cx="3051816" cy="2290577"/>
+          </a:xfrm>
+          <a:prstGeom prst="rect">
+            <a:avLst/>
+          </a:prstGeom>
+        </p:spPr>
+      </p:pic>
+      <p:sp>
+        <p:nvSpPr>
+          <p:cNvPr id="11" name="Textfeld 10">
+            <a:extLst>
+              <a:ext uri="{FF2B5EF4-FFF2-40B4-BE49-F238E27FC236}">
+                <a16:creationId xmlns:a16="http://schemas.microsoft.com/office/drawing/2014/main" id="{D6246D1C-E8A3-4A8F-B848-86C8CC272F8A}"/>
+              </a:ext>
+            </a:extLst>
+          </p:cNvPr>
+          <p:cNvSpPr txBox="1"/>
+          <p:nvPr/>
+        </p:nvSpPr>
+        <p:spPr>
+          <a:xfrm>
+            <a:off x="1452880" y="5445760"/>
+            <a:ext cx="2806025" cy="369332"/>
+          </a:xfrm>
+          <a:prstGeom prst="rect">
+            <a:avLst/>
+          </a:prstGeom>
+          <a:noFill/>
+        </p:spPr>
+        <p:txBody>
+          <a:bodyPr wrap="none" rtlCol="0">
+            <a:spAutoFit/>
+          </a:bodyPr>
+          <a:lstStyle/>
+          <a:p>
+            <a:r>
+              <a:rPr lang="de-CH" dirty="0"/>
+              <a:t>Bild einfügen für Kalibration</a:t>
             </a:r>
           </a:p>
         </p:txBody>
@@ -5256,6 +5375,78 @@
           </a:p>
         </p:txBody>
       </p:sp>
+      <p:pic>
+        <p:nvPicPr>
+          <p:cNvPr id="16" name="Grafik 15">
+            <a:extLst>
+              <a:ext uri="{FF2B5EF4-FFF2-40B4-BE49-F238E27FC236}">
+                <a16:creationId xmlns:a16="http://schemas.microsoft.com/office/drawing/2014/main" id="{887BD1D4-1AE2-4431-A1F2-782D8ACD801D}"/>
+              </a:ext>
+            </a:extLst>
+          </p:cNvPr>
+          <p:cNvPicPr>
+            <a:picLocks noChangeAspect="1"/>
+          </p:cNvPicPr>
+          <p:nvPr/>
+        </p:nvPicPr>
+        <p:blipFill>
+          <a:blip r:embed="rId2">
+            <a:extLst>
+              <a:ext uri="{28A0092B-C50C-407E-A947-70E740481C1C}">
+                <a14:useLocalDpi xmlns:a14="http://schemas.microsoft.com/office/drawing/2010/main" val="0"/>
+              </a:ext>
+            </a:extLst>
+          </a:blip>
+          <a:stretch>
+            <a:fillRect/>
+          </a:stretch>
+        </p:blipFill>
+        <p:spPr>
+          <a:xfrm>
+            <a:off x="8301984" y="790577"/>
+            <a:ext cx="3051816" cy="2290577"/>
+          </a:xfrm>
+          <a:prstGeom prst="rect">
+            <a:avLst/>
+          </a:prstGeom>
+        </p:spPr>
+      </p:pic>
+      <p:pic>
+        <p:nvPicPr>
+          <p:cNvPr id="18" name="Grafik 17" descr="Ein Bild, das Uhr enthält.&#10;&#10;Automatisch generierte Beschreibung">
+            <a:extLst>
+              <a:ext uri="{FF2B5EF4-FFF2-40B4-BE49-F238E27FC236}">
+                <a16:creationId xmlns:a16="http://schemas.microsoft.com/office/drawing/2014/main" id="{EA067AC0-A7A5-4A98-A0CD-DCBDA6005542}"/>
+              </a:ext>
+            </a:extLst>
+          </p:cNvPr>
+          <p:cNvPicPr>
+            <a:picLocks noChangeAspect="1"/>
+          </p:cNvPicPr>
+          <p:nvPr/>
+        </p:nvPicPr>
+        <p:blipFill>
+          <a:blip r:embed="rId3">
+            <a:extLst>
+              <a:ext uri="{28A0092B-C50C-407E-A947-70E740481C1C}">
+                <a14:useLocalDpi xmlns:a14="http://schemas.microsoft.com/office/drawing/2010/main" val="0"/>
+              </a:ext>
+            </a:extLst>
+          </a:blip>
+          <a:stretch>
+            <a:fillRect/>
+          </a:stretch>
+        </p:blipFill>
+        <p:spPr>
+          <a:xfrm>
+            <a:off x="8301984" y="3672673"/>
+            <a:ext cx="3051816" cy="2290577"/>
+          </a:xfrm>
+          <a:prstGeom prst="rect">
+            <a:avLst/>
+          </a:prstGeom>
+        </p:spPr>
+      </p:pic>
     </p:spTree>
     <p:extLst>
       <p:ext uri="{BB962C8B-B14F-4D97-AF65-F5344CB8AC3E}">

</xml_diff>